<commit_message>
Aula 06 Microcont 12042023
</commit_message>
<xml_diff>
--- a/01 Classes/Aula 04 - Programação Microcontroladores - Arduíno Raspberry PI.pptx
+++ b/01 Classes/Aula 04 - Programação Microcontroladores - Arduíno Raspberry PI.pptx
@@ -8689,7 +8689,19 @@
                 <a:latin typeface="Times New Roman" panose="02020603050405020304" pitchFamily="18" charset="0"/>
                 <a:cs typeface="Times New Roman" panose="02020603050405020304" pitchFamily="18" charset="0"/>
               </a:rPr>
-              <a:t>Criar um mapa conceitual </a:t>
+              <a:t>Criar um mapa conceitual:</a:t>
+            </a:r>
+          </a:p>
+          <a:p>
+            <a:pPr marL="0" indent="0" algn="just">
+              <a:buNone/>
+            </a:pPr>
+            <a:r>
+              <a:rPr lang="pt-BR" sz="2400" dirty="0">
+                <a:latin typeface="Times New Roman" panose="02020603050405020304" pitchFamily="18" charset="0"/>
+                <a:cs typeface="Times New Roman" panose="02020603050405020304" pitchFamily="18" charset="0"/>
+              </a:rPr>
+              <a:t> </a:t>
             </a:r>
             <a:r>
               <a:rPr lang="pt-BR" sz="2400" b="1" dirty="0">
@@ -8699,7 +8711,7 @@
                 <a:latin typeface="Times New Roman" panose="02020603050405020304" pitchFamily="18" charset="0"/>
                 <a:cs typeface="Times New Roman" panose="02020603050405020304" pitchFamily="18" charset="0"/>
               </a:rPr>
-              <a:t>Arduino </a:t>
+              <a:t>Arduino Uno R3 </a:t>
             </a:r>
             <a:r>
               <a:rPr lang="pt-BR" sz="2400" b="1" dirty="0" err="1">
@@ -8724,12 +8736,32 @@
             <a:r>
               <a:rPr lang="pt-BR" sz="2400" b="1" dirty="0" err="1">
                 <a:solidFill>
+                  <a:schemeClr val="tx1"/>
+                </a:solidFill>
+                <a:latin typeface="Times New Roman" panose="02020603050405020304" pitchFamily="18" charset="0"/>
+                <a:cs typeface="Times New Roman" panose="02020603050405020304" pitchFamily="18" charset="0"/>
+              </a:rPr>
+              <a:t>NodeMCU</a:t>
+            </a:r>
+            <a:r>
+              <a:rPr lang="pt-BR" sz="2400" b="1" dirty="0">
+                <a:solidFill>
                   <a:srgbClr val="FF0000"/>
                 </a:solidFill>
                 <a:latin typeface="Times New Roman" panose="02020603050405020304" pitchFamily="18" charset="0"/>
                 <a:cs typeface="Times New Roman" panose="02020603050405020304" pitchFamily="18" charset="0"/>
               </a:rPr>
-              <a:t>NodeMCU</a:t>
+              <a:t> </a:t>
+            </a:r>
+            <a:r>
+              <a:rPr lang="pt-BR" sz="2400" b="1" dirty="0" err="1">
+                <a:solidFill>
+                  <a:srgbClr val="FF0000"/>
+                </a:solidFill>
+                <a:latin typeface="Times New Roman" panose="02020603050405020304" pitchFamily="18" charset="0"/>
+                <a:cs typeface="Times New Roman" panose="02020603050405020304" pitchFamily="18" charset="0"/>
+              </a:rPr>
+              <a:t>vs</a:t>
             </a:r>
             <a:r>
               <a:rPr lang="pt-BR" sz="2400" b="1" dirty="0">
@@ -8749,6 +8781,26 @@
                 <a:latin typeface="Times New Roman" panose="02020603050405020304" pitchFamily="18" charset="0"/>
                 <a:cs typeface="Times New Roman" panose="02020603050405020304" pitchFamily="18" charset="0"/>
               </a:rPr>
+              <a:t>Raspberry</a:t>
+            </a:r>
+            <a:r>
+              <a:rPr lang="pt-BR" sz="2400" b="1" dirty="0">
+                <a:solidFill>
+                  <a:srgbClr val="FF0000"/>
+                </a:solidFill>
+                <a:latin typeface="Times New Roman" panose="02020603050405020304" pitchFamily="18" charset="0"/>
+                <a:cs typeface="Times New Roman" panose="02020603050405020304" pitchFamily="18" charset="0"/>
+              </a:rPr>
+              <a:t> Pi 4 </a:t>
+            </a:r>
+            <a:r>
+              <a:rPr lang="pt-BR" sz="2400" b="1" dirty="0" err="1">
+                <a:solidFill>
+                  <a:srgbClr val="FF0000"/>
+                </a:solidFill>
+                <a:latin typeface="Times New Roman" panose="02020603050405020304" pitchFamily="18" charset="0"/>
+                <a:cs typeface="Times New Roman" panose="02020603050405020304" pitchFamily="18" charset="0"/>
+              </a:rPr>
               <a:t>vs</a:t>
             </a:r>
             <a:r>
@@ -8764,22 +8816,12 @@
             <a:r>
               <a:rPr lang="pt-BR" sz="2400" b="1" dirty="0" err="1">
                 <a:solidFill>
-                  <a:srgbClr val="FF0000"/>
-                </a:solidFill>
-                <a:latin typeface="Times New Roman" panose="02020603050405020304" pitchFamily="18" charset="0"/>
-                <a:cs typeface="Times New Roman" panose="02020603050405020304" pitchFamily="18" charset="0"/>
-              </a:rPr>
-              <a:t>Raspberry</a:t>
-            </a:r>
-            <a:r>
-              <a:rPr lang="pt-BR" sz="2400" b="1" dirty="0">
-                <a:solidFill>
-                  <a:srgbClr val="FF0000"/>
-                </a:solidFill>
-                <a:latin typeface="Times New Roman" panose="02020603050405020304" pitchFamily="18" charset="0"/>
-                <a:cs typeface="Times New Roman" panose="02020603050405020304" pitchFamily="18" charset="0"/>
-              </a:rPr>
-              <a:t> Pi</a:t>
+                  <a:schemeClr val="tx1"/>
+                </a:solidFill>
+                <a:latin typeface="Times New Roman" panose="02020603050405020304" pitchFamily="18" charset="0"/>
+                <a:cs typeface="Times New Roman" panose="02020603050405020304" pitchFamily="18" charset="0"/>
+              </a:rPr>
+              <a:t>PICSimLab</a:t>
             </a:r>
             <a:r>
               <a:rPr lang="pt-BR" sz="2400" dirty="0">
@@ -8830,15 +8872,7 @@
                 <a:cs typeface="Times New Roman" panose="02020603050405020304" pitchFamily="18" charset="0"/>
                 <a:hlinkClick r:id="rId6"/>
               </a:rPr>
-              <a:t>https://www.banana-pi.</a:t>
-            </a:r>
-            <a:r>
-              <a:rPr lang="pt-BR" sz="2400">
-                <a:latin typeface="Times New Roman" panose="02020603050405020304" pitchFamily="18" charset="0"/>
-                <a:cs typeface="Times New Roman" panose="02020603050405020304" pitchFamily="18" charset="0"/>
-                <a:hlinkClick r:id="rId6"/>
-              </a:rPr>
-              <a:t>org/</a:t>
+              <a:t>https://www.banana-pi.org/</a:t>
             </a:r>
             <a:endParaRPr lang="pt-BR" sz="2400" dirty="0">
               <a:latin typeface="Times New Roman" panose="02020603050405020304" pitchFamily="18" charset="0"/>

</xml_diff>